<commit_message>
updated for 2016 toolkit
</commit_message>
<xml_diff>
--- a/Intro2D3.pptx
+++ b/Intro2D3.pptx
@@ -3809,7 +3809,7 @@
           <a:p>
             <a:fld id="{8EF132DC-35E1-4077-BC46-972F94400611}" type="datetimeFigureOut">
               <a:rPr lang="en-US" smtClean="0"/>
-              <a:t>12/13/2015</a:t>
+              <a:t>5/2/2016</a:t>
             </a:fld>
             <a:endParaRPr lang="en-US"/>
           </a:p>
@@ -4762,7 +4762,7 @@
           <a:p>
             <a:fld id="{557D511F-992E-4508-878E-64B76E155AD3}" type="datetimeFigureOut">
               <a:rPr lang="en-US" smtClean="0"/>
-              <a:t>12/13/2015</a:t>
+              <a:t>5/2/2016</a:t>
             </a:fld>
             <a:endParaRPr lang="en-US"/>
           </a:p>
@@ -4973,7 +4973,7 @@
           <a:p>
             <a:fld id="{557D511F-992E-4508-878E-64B76E155AD3}" type="datetimeFigureOut">
               <a:rPr lang="en-US" smtClean="0"/>
-              <a:t>12/13/2015</a:t>
+              <a:t>5/2/2016</a:t>
             </a:fld>
             <a:endParaRPr lang="en-US"/>
           </a:p>
@@ -5147,7 +5147,7 @@
           <a:p>
             <a:fld id="{557D511F-992E-4508-878E-64B76E155AD3}" type="datetimeFigureOut">
               <a:rPr lang="en-US" smtClean="0"/>
-              <a:t>12/13/2015</a:t>
+              <a:t>5/2/2016</a:t>
             </a:fld>
             <a:endParaRPr lang="en-US"/>
           </a:p>
@@ -5287,7 +5287,7 @@
           <a:p>
             <a:fld id="{557D511F-992E-4508-878E-64B76E155AD3}" type="datetimeFigureOut">
               <a:rPr lang="en-US" smtClean="0"/>
-              <a:t>12/13/2015</a:t>
+              <a:t>5/2/2016</a:t>
             </a:fld>
             <a:endParaRPr lang="en-US"/>
           </a:p>
@@ -5564,7 +5564,7 @@
           <a:p>
             <a:fld id="{557D511F-992E-4508-878E-64B76E155AD3}" type="datetimeFigureOut">
               <a:rPr lang="en-US" smtClean="0"/>
-              <a:t>12/13/2015</a:t>
+              <a:t>5/2/2016</a:t>
             </a:fld>
             <a:endParaRPr lang="en-US"/>
           </a:p>
@@ -5821,7 +5821,7 @@
           <a:p>
             <a:fld id="{557D511F-992E-4508-878E-64B76E155AD3}" type="datetimeFigureOut">
               <a:rPr lang="en-US" smtClean="0"/>
-              <a:t>12/13/2015</a:t>
+              <a:t>5/2/2016</a:t>
             </a:fld>
             <a:endParaRPr lang="en-US"/>
           </a:p>
@@ -6034,7 +6034,7 @@
           <a:p>
             <a:fld id="{557D511F-992E-4508-878E-64B76E155AD3}" type="datetimeFigureOut">
               <a:rPr lang="en-US" smtClean="0"/>
-              <a:t>12/13/2015</a:t>
+              <a:t>5/2/2016</a:t>
             </a:fld>
             <a:endParaRPr lang="en-US"/>
           </a:p>
@@ -6453,7 +6453,11 @@
           <a:p>
             <a:r>
               <a:rPr lang="en-US" sz="3200" dirty="0" smtClean="0"/>
-              <a:t>The Researcher’s Toolkit 2015</a:t>
+              <a:t>The Researcher’s Toolkit </a:t>
+            </a:r>
+            <a:r>
+              <a:rPr lang="en-US" sz="3200" dirty="0" smtClean="0"/>
+              <a:t>2016</a:t>
             </a:r>
             <a:r>
               <a:rPr lang="en-US" dirty="0"/>
@@ -6464,7 +6468,7 @@
             </a:br>
             <a:r>
               <a:rPr lang="en-US" dirty="0" smtClean="0"/>
-              <a:t>D3.js</a:t>
+              <a:t>Interactive Visualization with D3.js</a:t>
             </a:r>
             <a:endParaRPr lang="en-US" dirty="0"/>
           </a:p>
@@ -7036,7 +7040,6 @@
               <a:rPr lang="en-US" dirty="0"/>
               <a:t>://github.com/febret/intro2D3</a:t>
             </a:r>
-            <a:endParaRPr lang="en-US" dirty="0"/>
           </a:p>
         </p:txBody>
       </p:sp>
@@ -8822,9 +8825,118 @@
           <a:lstStyle/>
           <a:p>
             <a:r>
+              <a:rPr lang="en-US" dirty="0" smtClean="0"/>
+              <a:t>Software Carpentry: </a:t>
+            </a:r>
+            <a:r>
+              <a:rPr lang="en-US" dirty="0" smtClean="0">
+                <a:hlinkClick r:id="rId2"/>
+              </a:rPr>
+              <a:t>http</a:t>
+            </a:r>
+            <a:r>
+              <a:rPr lang="en-US" dirty="0">
+                <a:hlinkClick r:id="rId2"/>
+              </a:rPr>
+              <a:t>://dl.heeere.com/swc/d3</a:t>
+            </a:r>
+            <a:r>
+              <a:rPr lang="en-US" dirty="0" smtClean="0">
+                <a:hlinkClick r:id="rId2"/>
+              </a:rPr>
+              <a:t>/</a:t>
+            </a:r>
+            <a:endParaRPr lang="en-US" dirty="0" smtClean="0"/>
+          </a:p>
+          <a:p>
+            <a:pPr lvl="1"/>
+            <a:r>
+              <a:rPr lang="en-US" dirty="0" smtClean="0"/>
+              <a:t>Same tutorial</a:t>
+            </a:r>
+          </a:p>
+          <a:p>
+            <a:pPr lvl="1"/>
+            <a:r>
+              <a:rPr lang="en-US" dirty="0" smtClean="0"/>
+              <a:t>Some info on publishing your project</a:t>
+            </a:r>
+          </a:p>
+          <a:p>
+            <a:pPr lvl="1"/>
+            <a:endParaRPr lang="en-US" dirty="0"/>
+          </a:p>
+          <a:p>
+            <a:r>
               <a:rPr lang="en-US" dirty="0"/>
-              <a:t>http://dl.heeere.com/swc/d3/</a:t>
-            </a:r>
+              <a:t>API Reference: </a:t>
+            </a:r>
+            <a:r>
+              <a:rPr lang="en-US" dirty="0">
+                <a:hlinkClick r:id="rId3"/>
+              </a:rPr>
+              <a:t>https://</a:t>
+            </a:r>
+            <a:r>
+              <a:rPr lang="en-US" dirty="0" smtClean="0">
+                <a:hlinkClick r:id="rId3"/>
+              </a:rPr>
+              <a:t>github.com/mbostock/d3/wiki/API-Reference</a:t>
+            </a:r>
+            <a:endParaRPr lang="en-US" dirty="0" smtClean="0"/>
+          </a:p>
+          <a:p>
+            <a:endParaRPr lang="en-US" dirty="0"/>
+          </a:p>
+          <a:p>
+            <a:r>
+              <a:rPr lang="en-US" dirty="0" smtClean="0"/>
+              <a:t>Libraries that use D3 </a:t>
+            </a:r>
+            <a:r>
+              <a:rPr lang="en-US" dirty="0" smtClean="0">
+                <a:hlinkClick r:id="rId4"/>
+              </a:rPr>
+              <a:t>http</a:t>
+            </a:r>
+            <a:r>
+              <a:rPr lang="en-US" dirty="0">
+                <a:hlinkClick r:id="rId4"/>
+              </a:rPr>
+              <a:t>://</a:t>
+            </a:r>
+            <a:r>
+              <a:rPr lang="en-US" dirty="0" smtClean="0">
+                <a:hlinkClick r:id="rId4"/>
+              </a:rPr>
+              <a:t>mikemcdearmon.com/portfolio/techposts/charting-libraries-using-d3</a:t>
+            </a:r>
+            <a:endParaRPr lang="en-US" dirty="0" smtClean="0"/>
+          </a:p>
+          <a:p>
+            <a:endParaRPr lang="en-US" dirty="0"/>
+          </a:p>
+          <a:p>
+            <a:r>
+              <a:rPr lang="en-US" dirty="0"/>
+              <a:t>Workshop material: </a:t>
+            </a:r>
+            <a:r>
+              <a:rPr lang="en-US" dirty="0">
+                <a:hlinkClick r:id="rId5"/>
+              </a:rPr>
+              <a:t>https://</a:t>
+            </a:r>
+            <a:r>
+              <a:rPr lang="en-US" dirty="0" smtClean="0">
+                <a:hlinkClick r:id="rId5"/>
+              </a:rPr>
+              <a:t>github.com/febret/intro2D3</a:t>
+            </a:r>
+            <a:endParaRPr lang="en-US" dirty="0" smtClean="0"/>
+          </a:p>
+          <a:p>
+            <a:endParaRPr lang="en-US" dirty="0"/>
           </a:p>
         </p:txBody>
       </p:sp>
@@ -9044,8 +9156,16 @@
           <a:lstStyle/>
           <a:p>
             <a:r>
-              <a:rPr lang="en-US" dirty="0" smtClean="0"/>
-              <a:t>How we can help</a:t>
+              <a:rPr lang="en-US" b="1" dirty="0" err="1">
+                <a:latin typeface="Calisto MT" panose="02040603050505030304" pitchFamily="18" charset="0"/>
+              </a:rPr>
+              <a:t>Northwestern</a:t>
+            </a:r>
+            <a:r>
+              <a:rPr lang="en-US" dirty="0" err="1">
+                <a:latin typeface="Calibri Light" panose="020F0302020204030204" pitchFamily="34" charset="0"/>
+              </a:rPr>
+              <a:t>|Visualization</a:t>
             </a:r>
             <a:endParaRPr lang="en-US" dirty="0"/>
           </a:p>
@@ -9063,7 +9183,7 @@
         </p:nvSpPr>
         <p:spPr>
           <a:xfrm>
-            <a:off x="838200" y="990600"/>
+            <a:off x="827926" y="733746"/>
             <a:ext cx="10515600" cy="5186363"/>
           </a:xfrm>
         </p:spPr>
@@ -9071,97 +9191,183 @@
           <a:bodyPr/>
           <a:lstStyle/>
           <a:p>
-            <a:r>
-              <a:rPr lang="en-US" b="1" dirty="0" smtClean="0"/>
-              <a:t>First Step: </a:t>
+            <a:pPr marL="285750" indent="-285750"/>
+            <a:r>
+              <a:rPr lang="en-US" dirty="0"/>
+              <a:t>Part of Research Computing </a:t>
             </a:r>
             <a:r>
               <a:rPr lang="en-US" dirty="0" smtClean="0"/>
+              <a:t>Group</a:t>
+            </a:r>
+          </a:p>
+          <a:p>
+            <a:pPr marL="285750" indent="-285750"/>
+            <a:endParaRPr lang="en-US" dirty="0"/>
+          </a:p>
+          <a:p>
+            <a:pPr marL="285750" indent="-285750"/>
+            <a:r>
+              <a:rPr lang="en-US" dirty="0"/>
+              <a:t>Illustration, Animation &amp; Interactive Visualization </a:t>
+            </a:r>
+            <a:r>
+              <a:rPr lang="en-US" dirty="0" smtClean="0"/>
+              <a:t>Services</a:t>
+            </a:r>
+          </a:p>
+          <a:p>
+            <a:pPr marL="285750" indent="-285750"/>
+            <a:endParaRPr lang="en-US" dirty="0"/>
+          </a:p>
+          <a:p>
+            <a:pPr marL="285750" indent="-285750"/>
+            <a:r>
+              <a:rPr lang="en-US" dirty="0"/>
+              <a:t>We work with every School at </a:t>
+            </a:r>
+            <a:r>
+              <a:rPr lang="en-US" dirty="0" smtClean="0"/>
+              <a:t>Northwestern</a:t>
+            </a:r>
+          </a:p>
+          <a:p>
+            <a:pPr marL="285750" indent="-285750"/>
+            <a:endParaRPr lang="en-US" dirty="0"/>
+          </a:p>
+          <a:p>
+            <a:pPr marL="285750" indent="-285750"/>
+            <a:r>
+              <a:rPr lang="en-US" b="1" dirty="0"/>
+              <a:t>Activities:</a:t>
+            </a:r>
+          </a:p>
+          <a:p>
+            <a:pPr marL="742950" lvl="1" indent="-285750"/>
+            <a:r>
+              <a:rPr lang="en-US" sz="2400" dirty="0"/>
               <a:t>Consultation</a:t>
             </a:r>
           </a:p>
           <a:p>
-            <a:pPr lvl="1"/>
-            <a:r>
-              <a:rPr lang="en-US" dirty="0" smtClean="0"/>
-              <a:t>We learn about your research domain and your problem</a:t>
-            </a:r>
-          </a:p>
-          <a:p>
-            <a:pPr lvl="1"/>
-            <a:r>
-              <a:rPr lang="en-US" dirty="0" smtClean="0"/>
-              <a:t>Investigate existing solutions</a:t>
-            </a:r>
-          </a:p>
-          <a:p>
-            <a:endParaRPr lang="en-US" dirty="0" smtClean="0"/>
-          </a:p>
-          <a:p>
-            <a:r>
-              <a:rPr lang="en-US" dirty="0" smtClean="0"/>
-              <a:t>Proof-of-concept / preliminary app</a:t>
-            </a:r>
-          </a:p>
-          <a:p>
-            <a:pPr lvl="1"/>
-            <a:r>
-              <a:rPr lang="en-US" dirty="0" smtClean="0"/>
-              <a:t>We start working with your data</a:t>
-            </a:r>
-          </a:p>
-          <a:p>
-            <a:pPr lvl="1"/>
-            <a:r>
-              <a:rPr lang="en-US" b="1" dirty="0" smtClean="0"/>
-              <a:t>Objective: </a:t>
-            </a:r>
-            <a:r>
-              <a:rPr lang="en-US" dirty="0" smtClean="0"/>
-              <a:t>working prototype + basic documentation</a:t>
-            </a:r>
-          </a:p>
-          <a:p>
-            <a:pPr lvl="1"/>
-            <a:r>
-              <a:rPr lang="en-US" dirty="0" smtClean="0"/>
-              <a:t>Source code</a:t>
-            </a:r>
-          </a:p>
-          <a:p>
-            <a:pPr lvl="1"/>
-            <a:endParaRPr lang="en-US" dirty="0" smtClean="0"/>
-          </a:p>
-          <a:p>
-            <a:r>
-              <a:rPr lang="en-US" b="1" dirty="0" smtClean="0"/>
-              <a:t>Moving Forward</a:t>
-            </a:r>
-          </a:p>
-          <a:p>
-            <a:pPr lvl="1"/>
-            <a:r>
-              <a:rPr lang="en-US" dirty="0" smtClean="0"/>
-              <a:t>We provide time / cost estimate for your project</a:t>
-            </a:r>
-          </a:p>
-          <a:p>
-            <a:pPr lvl="1"/>
-            <a:r>
-              <a:rPr lang="en-US" dirty="0" smtClean="0"/>
-              <a:t>Tiered estimates</a:t>
-            </a:r>
-          </a:p>
-          <a:p>
-            <a:pPr lvl="1"/>
-            <a:r>
-              <a:rPr lang="en-US" dirty="0" smtClean="0"/>
-              <a:t>Help Integrating visualization into your next grant</a:t>
-            </a:r>
-            <a:endParaRPr lang="en-US" dirty="0"/>
+            <a:pPr marL="742950" lvl="1" indent="-285750"/>
+            <a:r>
+              <a:rPr lang="en-US" sz="2400" dirty="0"/>
+              <a:t>Design &amp; Development</a:t>
+            </a:r>
+          </a:p>
+          <a:p>
+            <a:pPr marL="742950" lvl="1" indent="-285750"/>
+            <a:r>
+              <a:rPr lang="en-US" sz="2400" dirty="0"/>
+              <a:t>Training</a:t>
+            </a:r>
           </a:p>
         </p:txBody>
       </p:sp>
+      <p:pic>
+        <p:nvPicPr>
+          <p:cNvPr id="7" name="Content Placeholder 7"/>
+          <p:cNvPicPr>
+            <a:picLocks noChangeAspect="1"/>
+          </p:cNvPicPr>
+          <p:nvPr/>
+        </p:nvPicPr>
+        <p:blipFill rotWithShape="1">
+          <a:blip r:embed="rId4" cstate="print">
+            <a:extLst>
+              <a:ext uri="{28A0092B-C50C-407E-A947-70E740481C1C}">
+                <a14:useLocalDpi xmlns:a14="http://schemas.microsoft.com/office/drawing/2010/main" val="0"/>
+              </a:ext>
+            </a:extLst>
+          </a:blip>
+          <a:srcRect l="304" t="2170" r="69704" b="2266"/>
+          <a:stretch/>
+        </p:blipFill>
+        <p:spPr>
+          <a:xfrm>
+            <a:off x="5315661" y="4809246"/>
+            <a:ext cx="2923674" cy="1939991"/>
+          </a:xfrm>
+          <a:prstGeom prst="rect">
+            <a:avLst/>
+          </a:prstGeom>
+          <a:effectLst>
+            <a:outerShdw blurRad="63500" sx="102000" sy="102000" algn="ctr" rotWithShape="0">
+              <a:prstClr val="black">
+                <a:alpha val="40000"/>
+              </a:prstClr>
+            </a:outerShdw>
+          </a:effectLst>
+        </p:spPr>
+      </p:pic>
+      <p:pic>
+        <p:nvPicPr>
+          <p:cNvPr id="8" name="Picture 7"/>
+          <p:cNvPicPr>
+            <a:picLocks noChangeAspect="1"/>
+          </p:cNvPicPr>
+          <p:nvPr/>
+        </p:nvPicPr>
+        <p:blipFill rotWithShape="1">
+          <a:blip r:embed="rId5"/>
+          <a:srcRect t="15917" r="6861" b="11331"/>
+          <a:stretch/>
+        </p:blipFill>
+        <p:spPr>
+          <a:xfrm>
+            <a:off x="3169781" y="4819215"/>
+            <a:ext cx="1845089" cy="1899788"/>
+          </a:xfrm>
+          <a:prstGeom prst="rect">
+            <a:avLst/>
+          </a:prstGeom>
+          <a:effectLst>
+            <a:outerShdw blurRad="63500" sx="102000" sy="102000" algn="ctr" rotWithShape="0">
+              <a:prstClr val="black">
+                <a:alpha val="40000"/>
+              </a:prstClr>
+            </a:outerShdw>
+          </a:effectLst>
+        </p:spPr>
+      </p:pic>
+      <p:pic>
+        <p:nvPicPr>
+          <p:cNvPr id="9" name="Picture 8" descr="Screen Clipping"/>
+          <p:cNvPicPr>
+            <a:picLocks noChangeAspect="1"/>
+          </p:cNvPicPr>
+          <p:nvPr/>
+        </p:nvPicPr>
+        <p:blipFill>
+          <a:blip r:embed="rId6" cstate="print">
+            <a:extLst>
+              <a:ext uri="{28A0092B-C50C-407E-A947-70E740481C1C}">
+                <a14:useLocalDpi xmlns:a14="http://schemas.microsoft.com/office/drawing/2010/main" val="0"/>
+              </a:ext>
+            </a:extLst>
+          </a:blip>
+          <a:stretch>
+            <a:fillRect/>
+          </a:stretch>
+        </p:blipFill>
+        <p:spPr>
+          <a:xfrm>
+            <a:off x="8522075" y="4778762"/>
+            <a:ext cx="3449921" cy="1939990"/>
+          </a:xfrm>
+          <a:prstGeom prst="rect">
+            <a:avLst/>
+          </a:prstGeom>
+          <a:effectLst>
+            <a:outerShdw blurRad="152400" algn="ctr" rotWithShape="0">
+              <a:prstClr val="black">
+                <a:alpha val="40000"/>
+              </a:prstClr>
+            </a:outerShdw>
+          </a:effectLst>
+        </p:spPr>
+      </p:pic>
     </p:spTree>
     <p:extLst>
       <p:ext uri="{BB962C8B-B14F-4D97-AF65-F5344CB8AC3E}">
@@ -9235,58 +9441,33 @@
                                   </p:childTnLst>
                                 </p:cTn>
                               </p:par>
+                            </p:childTnLst>
+                          </p:cTn>
+                        </p:par>
+                      </p:childTnLst>
+                    </p:cTn>
+                  </p:par>
+                  <p:par>
+                    <p:cTn id="8" fill="hold">
+                      <p:stCondLst>
+                        <p:cond delay="indefinite"/>
+                      </p:stCondLst>
+                      <p:childTnLst>
+                        <p:par>
+                          <p:cTn id="9" fill="hold">
+                            <p:stCondLst>
+                              <p:cond delay="0"/>
+                            </p:stCondLst>
+                            <p:childTnLst>
                               <p:par>
-                                <p:cTn id="8" presetID="10" presetClass="entr" presetSubtype="0" fill="hold" grpId="0" nodeType="withEffect">
+                                <p:cTn id="10" presetID="10" presetClass="entr" presetSubtype="0" fill="hold" grpId="0" nodeType="clickEffect">
                                   <p:stCondLst>
                                     <p:cond delay="0"/>
                                   </p:stCondLst>
                                   <p:childTnLst>
                                     <p:set>
                                       <p:cBhvr>
-                                        <p:cTn id="9" dur="1" fill="hold">
-                                          <p:stCondLst>
-                                            <p:cond delay="0"/>
-                                          </p:stCondLst>
-                                        </p:cTn>
-                                        <p:tgtEl>
-                                          <p:spTgt spid="3">
-                                            <p:txEl>
-                                              <p:pRg st="1" end="1"/>
-                                            </p:txEl>
-                                          </p:spTgt>
-                                        </p:tgtEl>
-                                        <p:attrNameLst>
-                                          <p:attrName>style.visibility</p:attrName>
-                                        </p:attrNameLst>
-                                      </p:cBhvr>
-                                      <p:to>
-                                        <p:strVal val="visible"/>
-                                      </p:to>
-                                    </p:set>
-                                    <p:animEffect transition="in" filter="fade">
-                                      <p:cBhvr>
-                                        <p:cTn id="10" dur="500"/>
-                                        <p:tgtEl>
-                                          <p:spTgt spid="3">
-                                            <p:txEl>
-                                              <p:pRg st="1" end="1"/>
-                                            </p:txEl>
-                                          </p:spTgt>
-                                        </p:tgtEl>
-                                      </p:cBhvr>
-                                    </p:animEffect>
-                                  </p:childTnLst>
-                                </p:cTn>
-                              </p:par>
-                              <p:par>
-                                <p:cTn id="11" presetID="10" presetClass="entr" presetSubtype="0" fill="hold" grpId="0" nodeType="withEffect">
-                                  <p:stCondLst>
-                                    <p:cond delay="0"/>
-                                  </p:stCondLst>
-                                  <p:childTnLst>
-                                    <p:set>
-                                      <p:cBhvr>
-                                        <p:cTn id="12" dur="1" fill="hold">
+                                        <p:cTn id="11" dur="1" fill="hold">
                                           <p:stCondLst>
                                             <p:cond delay="0"/>
                                           </p:stCondLst>
@@ -9308,7 +9489,7 @@
                                     </p:set>
                                     <p:animEffect transition="in" filter="fade">
                                       <p:cBhvr>
-                                        <p:cTn id="13" dur="500"/>
+                                        <p:cTn id="12" dur="500"/>
                                         <p:tgtEl>
                                           <p:spTgt spid="3">
                                             <p:txEl>
@@ -9328,26 +9509,26 @@
                     </p:cTn>
                   </p:par>
                   <p:par>
-                    <p:cTn id="14" fill="hold">
+                    <p:cTn id="13" fill="hold">
                       <p:stCondLst>
                         <p:cond delay="indefinite"/>
                       </p:stCondLst>
                       <p:childTnLst>
                         <p:par>
-                          <p:cTn id="15" fill="hold">
+                          <p:cTn id="14" fill="hold">
                             <p:stCondLst>
                               <p:cond delay="0"/>
                             </p:stCondLst>
                             <p:childTnLst>
                               <p:par>
-                                <p:cTn id="16" presetID="10" presetClass="entr" presetSubtype="0" fill="hold" grpId="0" nodeType="clickEffect">
+                                <p:cTn id="15" presetID="10" presetClass="entr" presetSubtype="0" fill="hold" grpId="0" nodeType="clickEffect">
                                   <p:stCondLst>
                                     <p:cond delay="0"/>
                                   </p:stCondLst>
                                   <p:childTnLst>
                                     <p:set>
                                       <p:cBhvr>
-                                        <p:cTn id="17" dur="1" fill="hold">
+                                        <p:cTn id="16" dur="1" fill="hold">
                                           <p:stCondLst>
                                             <p:cond delay="0"/>
                                           </p:stCondLst>
@@ -9369,7 +9550,7 @@
                                     </p:set>
                                     <p:animEffect transition="in" filter="fade">
                                       <p:cBhvr>
-                                        <p:cTn id="18" dur="500"/>
+                                        <p:cTn id="17" dur="500"/>
                                         <p:tgtEl>
                                           <p:spTgt spid="3">
                                             <p:txEl>
@@ -9382,58 +9563,33 @@
                                   </p:childTnLst>
                                 </p:cTn>
                               </p:par>
+                            </p:childTnLst>
+                          </p:cTn>
+                        </p:par>
+                      </p:childTnLst>
+                    </p:cTn>
+                  </p:par>
+                  <p:par>
+                    <p:cTn id="18" fill="hold">
+                      <p:stCondLst>
+                        <p:cond delay="indefinite"/>
+                      </p:stCondLst>
+                      <p:childTnLst>
+                        <p:par>
+                          <p:cTn id="19" fill="hold">
+                            <p:stCondLst>
+                              <p:cond delay="0"/>
+                            </p:stCondLst>
+                            <p:childTnLst>
                               <p:par>
-                                <p:cTn id="19" presetID="10" presetClass="entr" presetSubtype="0" fill="hold" grpId="0" nodeType="withEffect">
+                                <p:cTn id="20" presetID="10" presetClass="entr" presetSubtype="0" fill="hold" grpId="0" nodeType="clickEffect">
                                   <p:stCondLst>
                                     <p:cond delay="0"/>
                                   </p:stCondLst>
                                   <p:childTnLst>
                                     <p:set>
                                       <p:cBhvr>
-                                        <p:cTn id="20" dur="1" fill="hold">
-                                          <p:stCondLst>
-                                            <p:cond delay="0"/>
-                                          </p:stCondLst>
-                                        </p:cTn>
-                                        <p:tgtEl>
-                                          <p:spTgt spid="3">
-                                            <p:txEl>
-                                              <p:pRg st="5" end="5"/>
-                                            </p:txEl>
-                                          </p:spTgt>
-                                        </p:tgtEl>
-                                        <p:attrNameLst>
-                                          <p:attrName>style.visibility</p:attrName>
-                                        </p:attrNameLst>
-                                      </p:cBhvr>
-                                      <p:to>
-                                        <p:strVal val="visible"/>
-                                      </p:to>
-                                    </p:set>
-                                    <p:animEffect transition="in" filter="fade">
-                                      <p:cBhvr>
-                                        <p:cTn id="21" dur="500"/>
-                                        <p:tgtEl>
-                                          <p:spTgt spid="3">
-                                            <p:txEl>
-                                              <p:pRg st="5" end="5"/>
-                                            </p:txEl>
-                                          </p:spTgt>
-                                        </p:tgtEl>
-                                      </p:cBhvr>
-                                    </p:animEffect>
-                                  </p:childTnLst>
-                                </p:cTn>
-                              </p:par>
-                              <p:par>
-                                <p:cTn id="22" presetID="10" presetClass="entr" presetSubtype="0" fill="hold" grpId="0" nodeType="withEffect">
-                                  <p:stCondLst>
-                                    <p:cond delay="0"/>
-                                  </p:stCondLst>
-                                  <p:childTnLst>
-                                    <p:set>
-                                      <p:cBhvr>
-                                        <p:cTn id="23" dur="1" fill="hold">
+                                        <p:cTn id="21" dur="1" fill="hold">
                                           <p:stCondLst>
                                             <p:cond delay="0"/>
                                           </p:stCondLst>
@@ -9455,7 +9611,7 @@
                                     </p:set>
                                     <p:animEffect transition="in" filter="fade">
                                       <p:cBhvr>
-                                        <p:cTn id="24" dur="500"/>
+                                        <p:cTn id="22" dur="500"/>
                                         <p:tgtEl>
                                           <p:spTgt spid="3">
                                             <p:txEl>
@@ -9469,14 +9625,14 @@
                                 </p:cTn>
                               </p:par>
                               <p:par>
-                                <p:cTn id="25" presetID="10" presetClass="entr" presetSubtype="0" fill="hold" grpId="0" nodeType="withEffect">
+                                <p:cTn id="23" presetID="10" presetClass="entr" presetSubtype="0" fill="hold" grpId="0" nodeType="withEffect">
                                   <p:stCondLst>
                                     <p:cond delay="0"/>
                                   </p:stCondLst>
                                   <p:childTnLst>
                                     <p:set>
                                       <p:cBhvr>
-                                        <p:cTn id="26" dur="1" fill="hold">
+                                        <p:cTn id="24" dur="1" fill="hold">
                                           <p:stCondLst>
                                             <p:cond delay="0"/>
                                           </p:stCondLst>
@@ -9498,7 +9654,7 @@
                                     </p:set>
                                     <p:animEffect transition="in" filter="fade">
                                       <p:cBhvr>
-                                        <p:cTn id="27" dur="500"/>
+                                        <p:cTn id="25" dur="500"/>
                                         <p:tgtEl>
                                           <p:spTgt spid="3">
                                             <p:txEl>
@@ -9511,33 +9667,58 @@
                                   </p:childTnLst>
                                 </p:cTn>
                               </p:par>
-                            </p:childTnLst>
-                          </p:cTn>
-                        </p:par>
-                      </p:childTnLst>
-                    </p:cTn>
-                  </p:par>
-                  <p:par>
-                    <p:cTn id="28" fill="hold">
-                      <p:stCondLst>
-                        <p:cond delay="indefinite"/>
-                      </p:stCondLst>
-                      <p:childTnLst>
-                        <p:par>
-                          <p:cTn id="29" fill="hold">
-                            <p:stCondLst>
-                              <p:cond delay="0"/>
-                            </p:stCondLst>
-                            <p:childTnLst>
                               <p:par>
-                                <p:cTn id="30" presetID="10" presetClass="entr" presetSubtype="0" fill="hold" grpId="0" nodeType="clickEffect">
+                                <p:cTn id="26" presetID="10" presetClass="entr" presetSubtype="0" fill="hold" grpId="0" nodeType="withEffect">
                                   <p:stCondLst>
                                     <p:cond delay="0"/>
                                   </p:stCondLst>
                                   <p:childTnLst>
                                     <p:set>
                                       <p:cBhvr>
-                                        <p:cTn id="31" dur="1" fill="hold">
+                                        <p:cTn id="27" dur="1" fill="hold">
+                                          <p:stCondLst>
+                                            <p:cond delay="0"/>
+                                          </p:stCondLst>
+                                        </p:cTn>
+                                        <p:tgtEl>
+                                          <p:spTgt spid="3">
+                                            <p:txEl>
+                                              <p:pRg st="8" end="8"/>
+                                            </p:txEl>
+                                          </p:spTgt>
+                                        </p:tgtEl>
+                                        <p:attrNameLst>
+                                          <p:attrName>style.visibility</p:attrName>
+                                        </p:attrNameLst>
+                                      </p:cBhvr>
+                                      <p:to>
+                                        <p:strVal val="visible"/>
+                                      </p:to>
+                                    </p:set>
+                                    <p:animEffect transition="in" filter="fade">
+                                      <p:cBhvr>
+                                        <p:cTn id="28" dur="500"/>
+                                        <p:tgtEl>
+                                          <p:spTgt spid="3">
+                                            <p:txEl>
+                                              <p:pRg st="8" end="8"/>
+                                            </p:txEl>
+                                          </p:spTgt>
+                                        </p:tgtEl>
+                                      </p:cBhvr>
+                                    </p:animEffect>
+                                  </p:childTnLst>
+                                </p:cTn>
+                              </p:par>
+                              <p:par>
+                                <p:cTn id="29" presetID="10" presetClass="entr" presetSubtype="0" fill="hold" grpId="0" nodeType="withEffect">
+                                  <p:stCondLst>
+                                    <p:cond delay="0"/>
+                                  </p:stCondLst>
+                                  <p:childTnLst>
+                                    <p:set>
+                                      <p:cBhvr>
+                                        <p:cTn id="30" dur="1" fill="hold">
                                           <p:stCondLst>
                                             <p:cond delay="0"/>
                                           </p:stCondLst>
@@ -9559,140 +9740,11 @@
                                     </p:set>
                                     <p:animEffect transition="in" filter="fade">
                                       <p:cBhvr>
-                                        <p:cTn id="32" dur="500"/>
+                                        <p:cTn id="31" dur="500"/>
                                         <p:tgtEl>
                                           <p:spTgt spid="3">
                                             <p:txEl>
                                               <p:pRg st="9" end="9"/>
-                                            </p:txEl>
-                                          </p:spTgt>
-                                        </p:tgtEl>
-                                      </p:cBhvr>
-                                    </p:animEffect>
-                                  </p:childTnLst>
-                                </p:cTn>
-                              </p:par>
-                              <p:par>
-                                <p:cTn id="33" presetID="10" presetClass="entr" presetSubtype="0" fill="hold" grpId="0" nodeType="withEffect">
-                                  <p:stCondLst>
-                                    <p:cond delay="0"/>
-                                  </p:stCondLst>
-                                  <p:childTnLst>
-                                    <p:set>
-                                      <p:cBhvr>
-                                        <p:cTn id="34" dur="1" fill="hold">
-                                          <p:stCondLst>
-                                            <p:cond delay="0"/>
-                                          </p:stCondLst>
-                                        </p:cTn>
-                                        <p:tgtEl>
-                                          <p:spTgt spid="3">
-                                            <p:txEl>
-                                              <p:pRg st="10" end="10"/>
-                                            </p:txEl>
-                                          </p:spTgt>
-                                        </p:tgtEl>
-                                        <p:attrNameLst>
-                                          <p:attrName>style.visibility</p:attrName>
-                                        </p:attrNameLst>
-                                      </p:cBhvr>
-                                      <p:to>
-                                        <p:strVal val="visible"/>
-                                      </p:to>
-                                    </p:set>
-                                    <p:animEffect transition="in" filter="fade">
-                                      <p:cBhvr>
-                                        <p:cTn id="35" dur="500"/>
-                                        <p:tgtEl>
-                                          <p:spTgt spid="3">
-                                            <p:txEl>
-                                              <p:pRg st="10" end="10"/>
-                                            </p:txEl>
-                                          </p:spTgt>
-                                        </p:tgtEl>
-                                      </p:cBhvr>
-                                    </p:animEffect>
-                                  </p:childTnLst>
-                                </p:cTn>
-                              </p:par>
-                              <p:par>
-                                <p:cTn id="36" presetID="10" presetClass="entr" presetSubtype="0" fill="hold" grpId="0" nodeType="withEffect">
-                                  <p:stCondLst>
-                                    <p:cond delay="0"/>
-                                  </p:stCondLst>
-                                  <p:childTnLst>
-                                    <p:set>
-                                      <p:cBhvr>
-                                        <p:cTn id="37" dur="1" fill="hold">
-                                          <p:stCondLst>
-                                            <p:cond delay="0"/>
-                                          </p:stCondLst>
-                                        </p:cTn>
-                                        <p:tgtEl>
-                                          <p:spTgt spid="3">
-                                            <p:txEl>
-                                              <p:pRg st="11" end="11"/>
-                                            </p:txEl>
-                                          </p:spTgt>
-                                        </p:tgtEl>
-                                        <p:attrNameLst>
-                                          <p:attrName>style.visibility</p:attrName>
-                                        </p:attrNameLst>
-                                      </p:cBhvr>
-                                      <p:to>
-                                        <p:strVal val="visible"/>
-                                      </p:to>
-                                    </p:set>
-                                    <p:animEffect transition="in" filter="fade">
-                                      <p:cBhvr>
-                                        <p:cTn id="38" dur="500"/>
-                                        <p:tgtEl>
-                                          <p:spTgt spid="3">
-                                            <p:txEl>
-                                              <p:pRg st="11" end="11"/>
-                                            </p:txEl>
-                                          </p:spTgt>
-                                        </p:tgtEl>
-                                      </p:cBhvr>
-                                    </p:animEffect>
-                                  </p:childTnLst>
-                                </p:cTn>
-                              </p:par>
-                              <p:par>
-                                <p:cTn id="39" presetID="10" presetClass="entr" presetSubtype="0" fill="hold" grpId="0" nodeType="withEffect">
-                                  <p:stCondLst>
-                                    <p:cond delay="0"/>
-                                  </p:stCondLst>
-                                  <p:childTnLst>
-                                    <p:set>
-                                      <p:cBhvr>
-                                        <p:cTn id="40" dur="1" fill="hold">
-                                          <p:stCondLst>
-                                            <p:cond delay="0"/>
-                                          </p:stCondLst>
-                                        </p:cTn>
-                                        <p:tgtEl>
-                                          <p:spTgt spid="3">
-                                            <p:txEl>
-                                              <p:pRg st="12" end="12"/>
-                                            </p:txEl>
-                                          </p:spTgt>
-                                        </p:tgtEl>
-                                        <p:attrNameLst>
-                                          <p:attrName>style.visibility</p:attrName>
-                                        </p:attrNameLst>
-                                      </p:cBhvr>
-                                      <p:to>
-                                        <p:strVal val="visible"/>
-                                      </p:to>
-                                    </p:set>
-                                    <p:animEffect transition="in" filter="fade">
-                                      <p:cBhvr>
-                                        <p:cTn id="41" dur="500"/>
-                                        <p:tgtEl>
-                                          <p:spTgt spid="3">
-                                            <p:txEl>
-                                              <p:pRg st="12" end="12"/>
                                             </p:txEl>
                                           </p:spTgt>
                                         </p:tgtEl>
@@ -9955,10 +10007,143 @@
           <a:bodyPr/>
           <a:lstStyle/>
           <a:p>
-            <a:endParaRPr lang="en-US"/>
+            <a:pPr marL="457200" indent="-457200">
+              <a:buFont typeface="+mj-lt"/>
+              <a:buAutoNum type="arabicPeriod"/>
+            </a:pPr>
+            <a:r>
+              <a:rPr lang="en-US" sz="3200" b="1" dirty="0" smtClean="0"/>
+              <a:t>HTML5 Technologies</a:t>
+            </a:r>
+          </a:p>
+          <a:p>
+            <a:pPr marL="457200" indent="-457200">
+              <a:buFont typeface="+mj-lt"/>
+              <a:buAutoNum type="arabicPeriod"/>
+            </a:pPr>
+            <a:endParaRPr lang="en-US" sz="3200" b="1" dirty="0" smtClean="0"/>
+          </a:p>
+          <a:p>
+            <a:pPr marL="457200" indent="-457200">
+              <a:buFont typeface="+mj-lt"/>
+              <a:buAutoNum type="arabicPeriod"/>
+            </a:pPr>
+            <a:r>
+              <a:rPr lang="en-US" sz="3200" b="1" dirty="0" smtClean="0"/>
+              <a:t>Introduction to D3</a:t>
+            </a:r>
+          </a:p>
+          <a:p>
+            <a:pPr marL="457200" indent="-457200">
+              <a:buFont typeface="+mj-lt"/>
+              <a:buAutoNum type="arabicPeriod"/>
+            </a:pPr>
+            <a:endParaRPr lang="en-US" sz="3200" b="1" dirty="0" smtClean="0"/>
+          </a:p>
+          <a:p>
+            <a:pPr marL="457200" indent="-457200">
+              <a:buFont typeface="+mj-lt"/>
+              <a:buAutoNum type="arabicPeriod"/>
+            </a:pPr>
+            <a:r>
+              <a:rPr lang="en-US" sz="3200" b="1" dirty="0" smtClean="0"/>
+              <a:t>Example Project</a:t>
+            </a:r>
+          </a:p>
+          <a:p>
+            <a:pPr marL="457200" indent="-457200">
+              <a:buFont typeface="+mj-lt"/>
+              <a:buAutoNum type="arabicPeriod"/>
+            </a:pPr>
+            <a:endParaRPr lang="en-US" sz="3200" b="1" dirty="0" smtClean="0"/>
+          </a:p>
+          <a:p>
+            <a:pPr marL="457200" indent="-457200">
+              <a:buFont typeface="+mj-lt"/>
+              <a:buAutoNum type="arabicPeriod"/>
+            </a:pPr>
+            <a:r>
+              <a:rPr lang="en-US" sz="3200" b="1" dirty="0" smtClean="0"/>
+              <a:t>Additional Resources</a:t>
+            </a:r>
+          </a:p>
+          <a:p>
+            <a:pPr marL="457200" indent="-457200">
+              <a:buFont typeface="+mj-lt"/>
+              <a:buAutoNum type="arabicPeriod"/>
+            </a:pPr>
+            <a:endParaRPr lang="en-US" dirty="0"/>
           </a:p>
         </p:txBody>
       </p:sp>
+      <p:sp>
+        <p:nvSpPr>
+          <p:cNvPr id="4" name="Rectangle 3"/>
+          <p:cNvSpPr/>
+          <p:nvPr/>
+        </p:nvSpPr>
+        <p:spPr>
+          <a:xfrm>
+            <a:off x="3214083" y="5375788"/>
+            <a:ext cx="6260047" cy="523220"/>
+          </a:xfrm>
+          <a:prstGeom prst="rect">
+            <a:avLst/>
+          </a:prstGeom>
+        </p:spPr>
+        <p:txBody>
+          <a:bodyPr wrap="none">
+            <a:spAutoFit/>
+          </a:bodyPr>
+          <a:lstStyle/>
+          <a:p>
+            <a:r>
+              <a:rPr lang="en-US" sz="2800" b="1" dirty="0">
+                <a:hlinkClick r:id="rId2"/>
+              </a:rPr>
+              <a:t>https://github.com/febret/intro2D3</a:t>
+            </a:r>
+            <a:endParaRPr lang="en-US" sz="2800" b="1" dirty="0"/>
+          </a:p>
+        </p:txBody>
+      </p:sp>
+      <p:pic>
+        <p:nvPicPr>
+          <p:cNvPr id="5" name="Picture 4"/>
+          <p:cNvPicPr>
+            <a:picLocks noChangeAspect="1"/>
+          </p:cNvPicPr>
+          <p:nvPr/>
+        </p:nvPicPr>
+        <p:blipFill>
+          <a:blip r:embed="rId3" cstate="print">
+            <a:duotone>
+              <a:prstClr val="black"/>
+              <a:schemeClr val="accent1">
+                <a:tint val="45000"/>
+                <a:satMod val="400000"/>
+              </a:schemeClr>
+            </a:duotone>
+            <a:extLst>
+              <a:ext uri="{28A0092B-C50C-407E-A947-70E740481C1C}">
+                <a14:useLocalDpi xmlns:a14="http://schemas.microsoft.com/office/drawing/2010/main" val="0"/>
+              </a:ext>
+            </a:extLst>
+          </a:blip>
+          <a:stretch>
+            <a:fillRect/>
+          </a:stretch>
+        </p:blipFill>
+        <p:spPr>
+          <a:xfrm>
+            <a:off x="2939935" y="5459899"/>
+            <a:ext cx="354998" cy="354998"/>
+          </a:xfrm>
+          <a:prstGeom prst="rect">
+            <a:avLst/>
+          </a:prstGeom>
+        </p:spPr>
+      </p:pic>
     </p:spTree>
     <p:extLst>
       <p:ext uri="{BB962C8B-B14F-4D97-AF65-F5344CB8AC3E}">
@@ -13834,7 +14019,7 @@
         </p:nvSpPr>
         <p:spPr>
           <a:xfrm>
-            <a:off x="167269" y="4245701"/>
+            <a:off x="308937" y="3170315"/>
             <a:ext cx="7008541" cy="1815882"/>
           </a:xfrm>
           <a:prstGeom prst="rect">
@@ -14204,7 +14389,7 @@
         </p:blipFill>
         <p:spPr>
           <a:xfrm>
-            <a:off x="8055116" y="3065728"/>
+            <a:off x="8196784" y="1990342"/>
             <a:ext cx="3530781" cy="3213265"/>
           </a:xfrm>
           <a:prstGeom prst="rect">
@@ -14287,36 +14472,50 @@
           <a:bodyPr/>
           <a:lstStyle/>
           <a:p>
+            <a:pPr marL="0" indent="0" algn="ctr">
+              <a:buNone/>
+            </a:pPr>
+            <a:r>
+              <a:rPr lang="en-US" sz="2800" dirty="0" smtClean="0"/>
+              <a:t>Data-driven Documents </a:t>
+            </a:r>
+            <a:r>
+              <a:rPr lang="en-US" sz="2800" b="1" dirty="0" smtClean="0">
+                <a:sym typeface="Wingdings" panose="05000000000000000000" pitchFamily="2" charset="2"/>
+              </a:rPr>
+              <a:t> </a:t>
+            </a:r>
+            <a:r>
+              <a:rPr lang="en-US" sz="2800" b="1" dirty="0" smtClean="0"/>
+              <a:t>Manipulate DOM based on data</a:t>
+            </a:r>
+          </a:p>
+          <a:p>
+            <a:r>
+              <a:rPr lang="en-US" dirty="0" smtClean="0"/>
+              <a:t>D3 is not </a:t>
+            </a:r>
             <a:r>
               <a:rPr lang="en-US" b="1" dirty="0" smtClean="0"/>
-              <a:t>Data-driven Documents</a:t>
-            </a:r>
-          </a:p>
-          <a:p>
-            <a:pPr lvl="1"/>
+              <a:t>just</a:t>
+            </a:r>
             <a:r>
               <a:rPr lang="en-US" dirty="0" smtClean="0"/>
-              <a:t>D3 = </a:t>
-            </a:r>
-            <a:r>
-              <a:rPr lang="en-US" b="1" dirty="0"/>
-              <a:t>M</a:t>
+              <a:t> a plotting library </a:t>
+            </a:r>
+          </a:p>
+          <a:p>
+            <a:r>
+              <a:rPr lang="en-US" dirty="0" smtClean="0"/>
+              <a:t>D3 makes it easier to </a:t>
             </a:r>
             <a:r>
               <a:rPr lang="en-US" b="1" dirty="0" smtClean="0"/>
-              <a:t>anipulate DOM based on data</a:t>
-            </a:r>
-          </a:p>
-          <a:p>
+              <a:t>create page content procedurally </a:t>
+            </a:r>
             <a:r>
               <a:rPr lang="en-US" dirty="0" smtClean="0"/>
-              <a:t>D3 is NOT a plotting library (not only…)</a:t>
-            </a:r>
-          </a:p>
-          <a:p>
-            <a:r>
-              <a:rPr lang="en-US" dirty="0" smtClean="0"/>
-              <a:t>D3 makes it easier to create page content procedurally based on data sources &amp; user inputs</a:t>
+              <a:t>based on data sources &amp; user inputs</a:t>
             </a:r>
           </a:p>
           <a:p>
@@ -14430,7 +14629,7 @@
         </p:nvSpPr>
         <p:spPr>
           <a:xfrm>
-            <a:off x="5717930" y="5123315"/>
+            <a:off x="5698612" y="4878616"/>
             <a:ext cx="6252033" cy="461665"/>
           </a:xfrm>
           <a:prstGeom prst="rect">
@@ -14529,9 +14728,625 @@
   <p:timing>
     <p:tnLst>
       <p:par>
-        <p:cTn id="1" dur="indefinite" restart="never" nodeType="tmRoot"/>
+        <p:cTn id="1" dur="indefinite" restart="never" nodeType="tmRoot">
+          <p:childTnLst>
+            <p:seq concurrent="1" nextAc="seek">
+              <p:cTn id="2" dur="indefinite" nodeType="mainSeq">
+                <p:childTnLst>
+                  <p:par>
+                    <p:cTn id="3" fill="hold">
+                      <p:stCondLst>
+                        <p:cond delay="indefinite"/>
+                      </p:stCondLst>
+                      <p:childTnLst>
+                        <p:par>
+                          <p:cTn id="4" fill="hold">
+                            <p:stCondLst>
+                              <p:cond delay="0"/>
+                            </p:stCondLst>
+                            <p:childTnLst>
+                              <p:par>
+                                <p:cTn id="5" presetID="10" presetClass="entr" presetSubtype="0" fill="hold" grpId="0" nodeType="clickEffect">
+                                  <p:stCondLst>
+                                    <p:cond delay="0"/>
+                                  </p:stCondLst>
+                                  <p:childTnLst>
+                                    <p:set>
+                                      <p:cBhvr>
+                                        <p:cTn id="6" dur="1" fill="hold">
+                                          <p:stCondLst>
+                                            <p:cond delay="0"/>
+                                          </p:stCondLst>
+                                        </p:cTn>
+                                        <p:tgtEl>
+                                          <p:spTgt spid="3">
+                                            <p:txEl>
+                                              <p:pRg st="0" end="0"/>
+                                            </p:txEl>
+                                          </p:spTgt>
+                                        </p:tgtEl>
+                                        <p:attrNameLst>
+                                          <p:attrName>style.visibility</p:attrName>
+                                        </p:attrNameLst>
+                                      </p:cBhvr>
+                                      <p:to>
+                                        <p:strVal val="visible"/>
+                                      </p:to>
+                                    </p:set>
+                                    <p:animEffect transition="in" filter="fade">
+                                      <p:cBhvr>
+                                        <p:cTn id="7" dur="500"/>
+                                        <p:tgtEl>
+                                          <p:spTgt spid="3">
+                                            <p:txEl>
+                                              <p:pRg st="0" end="0"/>
+                                            </p:txEl>
+                                          </p:spTgt>
+                                        </p:tgtEl>
+                                      </p:cBhvr>
+                                    </p:animEffect>
+                                  </p:childTnLst>
+                                </p:cTn>
+                              </p:par>
+                            </p:childTnLst>
+                          </p:cTn>
+                        </p:par>
+                      </p:childTnLst>
+                    </p:cTn>
+                  </p:par>
+                  <p:par>
+                    <p:cTn id="8" fill="hold">
+                      <p:stCondLst>
+                        <p:cond delay="indefinite"/>
+                      </p:stCondLst>
+                      <p:childTnLst>
+                        <p:par>
+                          <p:cTn id="9" fill="hold">
+                            <p:stCondLst>
+                              <p:cond delay="0"/>
+                            </p:stCondLst>
+                            <p:childTnLst>
+                              <p:par>
+                                <p:cTn id="10" presetID="10" presetClass="entr" presetSubtype="0" fill="hold" grpId="0" nodeType="clickEffect">
+                                  <p:stCondLst>
+                                    <p:cond delay="0"/>
+                                  </p:stCondLst>
+                                  <p:childTnLst>
+                                    <p:set>
+                                      <p:cBhvr>
+                                        <p:cTn id="11" dur="1" fill="hold">
+                                          <p:stCondLst>
+                                            <p:cond delay="0"/>
+                                          </p:stCondLst>
+                                        </p:cTn>
+                                        <p:tgtEl>
+                                          <p:spTgt spid="3">
+                                            <p:txEl>
+                                              <p:pRg st="1" end="1"/>
+                                            </p:txEl>
+                                          </p:spTgt>
+                                        </p:tgtEl>
+                                        <p:attrNameLst>
+                                          <p:attrName>style.visibility</p:attrName>
+                                        </p:attrNameLst>
+                                      </p:cBhvr>
+                                      <p:to>
+                                        <p:strVal val="visible"/>
+                                      </p:to>
+                                    </p:set>
+                                    <p:animEffect transition="in" filter="fade">
+                                      <p:cBhvr>
+                                        <p:cTn id="12" dur="500"/>
+                                        <p:tgtEl>
+                                          <p:spTgt spid="3">
+                                            <p:txEl>
+                                              <p:pRg st="1" end="1"/>
+                                            </p:txEl>
+                                          </p:spTgt>
+                                        </p:tgtEl>
+                                      </p:cBhvr>
+                                    </p:animEffect>
+                                  </p:childTnLst>
+                                </p:cTn>
+                              </p:par>
+                            </p:childTnLst>
+                          </p:cTn>
+                        </p:par>
+                      </p:childTnLst>
+                    </p:cTn>
+                  </p:par>
+                  <p:par>
+                    <p:cTn id="13" fill="hold">
+                      <p:stCondLst>
+                        <p:cond delay="indefinite"/>
+                      </p:stCondLst>
+                      <p:childTnLst>
+                        <p:par>
+                          <p:cTn id="14" fill="hold">
+                            <p:stCondLst>
+                              <p:cond delay="0"/>
+                            </p:stCondLst>
+                            <p:childTnLst>
+                              <p:par>
+                                <p:cTn id="15" presetID="10" presetClass="entr" presetSubtype="0" fill="hold" grpId="0" nodeType="clickEffect">
+                                  <p:stCondLst>
+                                    <p:cond delay="0"/>
+                                  </p:stCondLst>
+                                  <p:childTnLst>
+                                    <p:set>
+                                      <p:cBhvr>
+                                        <p:cTn id="16" dur="1" fill="hold">
+                                          <p:stCondLst>
+                                            <p:cond delay="0"/>
+                                          </p:stCondLst>
+                                        </p:cTn>
+                                        <p:tgtEl>
+                                          <p:spTgt spid="3">
+                                            <p:txEl>
+                                              <p:pRg st="2" end="2"/>
+                                            </p:txEl>
+                                          </p:spTgt>
+                                        </p:tgtEl>
+                                        <p:attrNameLst>
+                                          <p:attrName>style.visibility</p:attrName>
+                                        </p:attrNameLst>
+                                      </p:cBhvr>
+                                      <p:to>
+                                        <p:strVal val="visible"/>
+                                      </p:to>
+                                    </p:set>
+                                    <p:animEffect transition="in" filter="fade">
+                                      <p:cBhvr>
+                                        <p:cTn id="17" dur="500"/>
+                                        <p:tgtEl>
+                                          <p:spTgt spid="3">
+                                            <p:txEl>
+                                              <p:pRg st="2" end="2"/>
+                                            </p:txEl>
+                                          </p:spTgt>
+                                        </p:tgtEl>
+                                      </p:cBhvr>
+                                    </p:animEffect>
+                                  </p:childTnLst>
+                                </p:cTn>
+                              </p:par>
+                              <p:par>
+                                <p:cTn id="18" presetID="10" presetClass="entr" presetSubtype="0" fill="hold" grpId="0" nodeType="withEffect">
+                                  <p:stCondLst>
+                                    <p:cond delay="0"/>
+                                  </p:stCondLst>
+                                  <p:childTnLst>
+                                    <p:set>
+                                      <p:cBhvr>
+                                        <p:cTn id="19" dur="1" fill="hold">
+                                          <p:stCondLst>
+                                            <p:cond delay="0"/>
+                                          </p:stCondLst>
+                                        </p:cTn>
+                                        <p:tgtEl>
+                                          <p:spTgt spid="3">
+                                            <p:txEl>
+                                              <p:pRg st="3" end="3"/>
+                                            </p:txEl>
+                                          </p:spTgt>
+                                        </p:tgtEl>
+                                        <p:attrNameLst>
+                                          <p:attrName>style.visibility</p:attrName>
+                                        </p:attrNameLst>
+                                      </p:cBhvr>
+                                      <p:to>
+                                        <p:strVal val="visible"/>
+                                      </p:to>
+                                    </p:set>
+                                    <p:animEffect transition="in" filter="fade">
+                                      <p:cBhvr>
+                                        <p:cTn id="20" dur="500"/>
+                                        <p:tgtEl>
+                                          <p:spTgt spid="3">
+                                            <p:txEl>
+                                              <p:pRg st="3" end="3"/>
+                                            </p:txEl>
+                                          </p:spTgt>
+                                        </p:tgtEl>
+                                      </p:cBhvr>
+                                    </p:animEffect>
+                                  </p:childTnLst>
+                                </p:cTn>
+                              </p:par>
+                              <p:par>
+                                <p:cTn id="21" presetID="10" presetClass="entr" presetSubtype="0" fill="hold" grpId="0" nodeType="withEffect">
+                                  <p:stCondLst>
+                                    <p:cond delay="0"/>
+                                  </p:stCondLst>
+                                  <p:childTnLst>
+                                    <p:set>
+                                      <p:cBhvr>
+                                        <p:cTn id="22" dur="1" fill="hold">
+                                          <p:stCondLst>
+                                            <p:cond delay="0"/>
+                                          </p:stCondLst>
+                                        </p:cTn>
+                                        <p:tgtEl>
+                                          <p:spTgt spid="3">
+                                            <p:txEl>
+                                              <p:pRg st="4" end="4"/>
+                                            </p:txEl>
+                                          </p:spTgt>
+                                        </p:tgtEl>
+                                        <p:attrNameLst>
+                                          <p:attrName>style.visibility</p:attrName>
+                                        </p:attrNameLst>
+                                      </p:cBhvr>
+                                      <p:to>
+                                        <p:strVal val="visible"/>
+                                      </p:to>
+                                    </p:set>
+                                    <p:animEffect transition="in" filter="fade">
+                                      <p:cBhvr>
+                                        <p:cTn id="23" dur="500"/>
+                                        <p:tgtEl>
+                                          <p:spTgt spid="3">
+                                            <p:txEl>
+                                              <p:pRg st="4" end="4"/>
+                                            </p:txEl>
+                                          </p:spTgt>
+                                        </p:tgtEl>
+                                      </p:cBhvr>
+                                    </p:animEffect>
+                                  </p:childTnLst>
+                                </p:cTn>
+                              </p:par>
+                              <p:par>
+                                <p:cTn id="24" presetID="10" presetClass="entr" presetSubtype="0" fill="hold" grpId="0" nodeType="withEffect">
+                                  <p:stCondLst>
+                                    <p:cond delay="0"/>
+                                  </p:stCondLst>
+                                  <p:childTnLst>
+                                    <p:set>
+                                      <p:cBhvr>
+                                        <p:cTn id="25" dur="1" fill="hold">
+                                          <p:stCondLst>
+                                            <p:cond delay="0"/>
+                                          </p:stCondLst>
+                                        </p:cTn>
+                                        <p:tgtEl>
+                                          <p:spTgt spid="3">
+                                            <p:txEl>
+                                              <p:pRg st="5" end="5"/>
+                                            </p:txEl>
+                                          </p:spTgt>
+                                        </p:tgtEl>
+                                        <p:attrNameLst>
+                                          <p:attrName>style.visibility</p:attrName>
+                                        </p:attrNameLst>
+                                      </p:cBhvr>
+                                      <p:to>
+                                        <p:strVal val="visible"/>
+                                      </p:to>
+                                    </p:set>
+                                    <p:animEffect transition="in" filter="fade">
+                                      <p:cBhvr>
+                                        <p:cTn id="26" dur="500"/>
+                                        <p:tgtEl>
+                                          <p:spTgt spid="3">
+                                            <p:txEl>
+                                              <p:pRg st="5" end="5"/>
+                                            </p:txEl>
+                                          </p:spTgt>
+                                        </p:tgtEl>
+                                      </p:cBhvr>
+                                    </p:animEffect>
+                                  </p:childTnLst>
+                                </p:cTn>
+                              </p:par>
+                              <p:par>
+                                <p:cTn id="27" presetID="10" presetClass="entr" presetSubtype="0" fill="hold" grpId="0" nodeType="withEffect">
+                                  <p:stCondLst>
+                                    <p:cond delay="0"/>
+                                  </p:stCondLst>
+                                  <p:childTnLst>
+                                    <p:set>
+                                      <p:cBhvr>
+                                        <p:cTn id="28" dur="1" fill="hold">
+                                          <p:stCondLst>
+                                            <p:cond delay="0"/>
+                                          </p:stCondLst>
+                                        </p:cTn>
+                                        <p:tgtEl>
+                                          <p:spTgt spid="3">
+                                            <p:txEl>
+                                              <p:pRg st="6" end="6"/>
+                                            </p:txEl>
+                                          </p:spTgt>
+                                        </p:tgtEl>
+                                        <p:attrNameLst>
+                                          <p:attrName>style.visibility</p:attrName>
+                                        </p:attrNameLst>
+                                      </p:cBhvr>
+                                      <p:to>
+                                        <p:strVal val="visible"/>
+                                      </p:to>
+                                    </p:set>
+                                    <p:animEffect transition="in" filter="fade">
+                                      <p:cBhvr>
+                                        <p:cTn id="29" dur="500"/>
+                                        <p:tgtEl>
+                                          <p:spTgt spid="3">
+                                            <p:txEl>
+                                              <p:pRg st="6" end="6"/>
+                                            </p:txEl>
+                                          </p:spTgt>
+                                        </p:tgtEl>
+                                      </p:cBhvr>
+                                    </p:animEffect>
+                                  </p:childTnLst>
+                                </p:cTn>
+                              </p:par>
+                              <p:par>
+                                <p:cTn id="30" presetID="10" presetClass="entr" presetSubtype="0" fill="hold" grpId="0" nodeType="withEffect">
+                                  <p:stCondLst>
+                                    <p:cond delay="0"/>
+                                  </p:stCondLst>
+                                  <p:childTnLst>
+                                    <p:set>
+                                      <p:cBhvr>
+                                        <p:cTn id="31" dur="1" fill="hold">
+                                          <p:stCondLst>
+                                            <p:cond delay="0"/>
+                                          </p:stCondLst>
+                                        </p:cTn>
+                                        <p:tgtEl>
+                                          <p:spTgt spid="3">
+                                            <p:txEl>
+                                              <p:pRg st="7" end="7"/>
+                                            </p:txEl>
+                                          </p:spTgt>
+                                        </p:tgtEl>
+                                        <p:attrNameLst>
+                                          <p:attrName>style.visibility</p:attrName>
+                                        </p:attrNameLst>
+                                      </p:cBhvr>
+                                      <p:to>
+                                        <p:strVal val="visible"/>
+                                      </p:to>
+                                    </p:set>
+                                    <p:animEffect transition="in" filter="fade">
+                                      <p:cBhvr>
+                                        <p:cTn id="32" dur="500"/>
+                                        <p:tgtEl>
+                                          <p:spTgt spid="3">
+                                            <p:txEl>
+                                              <p:pRg st="7" end="7"/>
+                                            </p:txEl>
+                                          </p:spTgt>
+                                        </p:tgtEl>
+                                      </p:cBhvr>
+                                    </p:animEffect>
+                                  </p:childTnLst>
+                                </p:cTn>
+                              </p:par>
+                            </p:childTnLst>
+                          </p:cTn>
+                        </p:par>
+                      </p:childTnLst>
+                    </p:cTn>
+                  </p:par>
+                  <p:par>
+                    <p:cTn id="33" fill="hold">
+                      <p:stCondLst>
+                        <p:cond delay="indefinite"/>
+                      </p:stCondLst>
+                      <p:childTnLst>
+                        <p:par>
+                          <p:cTn id="34" fill="hold">
+                            <p:stCondLst>
+                              <p:cond delay="0"/>
+                            </p:stCondLst>
+                            <p:childTnLst>
+                              <p:par>
+                                <p:cTn id="35" presetID="10" presetClass="entr" presetSubtype="0" fill="hold" grpId="0" nodeType="clickEffect">
+                                  <p:stCondLst>
+                                    <p:cond delay="0"/>
+                                  </p:stCondLst>
+                                  <p:childTnLst>
+                                    <p:set>
+                                      <p:cBhvr>
+                                        <p:cTn id="36" dur="1" fill="hold">
+                                          <p:stCondLst>
+                                            <p:cond delay="0"/>
+                                          </p:stCondLst>
+                                        </p:cTn>
+                                        <p:tgtEl>
+                                          <p:spTgt spid="3">
+                                            <p:txEl>
+                                              <p:pRg st="8" end="8"/>
+                                            </p:txEl>
+                                          </p:spTgt>
+                                        </p:tgtEl>
+                                        <p:attrNameLst>
+                                          <p:attrName>style.visibility</p:attrName>
+                                        </p:attrNameLst>
+                                      </p:cBhvr>
+                                      <p:to>
+                                        <p:strVal val="visible"/>
+                                      </p:to>
+                                    </p:set>
+                                    <p:animEffect transition="in" filter="fade">
+                                      <p:cBhvr>
+                                        <p:cTn id="37" dur="500"/>
+                                        <p:tgtEl>
+                                          <p:spTgt spid="3">
+                                            <p:txEl>
+                                              <p:pRg st="8" end="8"/>
+                                            </p:txEl>
+                                          </p:spTgt>
+                                        </p:tgtEl>
+                                      </p:cBhvr>
+                                    </p:animEffect>
+                                  </p:childTnLst>
+                                </p:cTn>
+                              </p:par>
+                              <p:par>
+                                <p:cTn id="38" presetID="10" presetClass="entr" presetSubtype="0" fill="hold" grpId="0" nodeType="withEffect">
+                                  <p:stCondLst>
+                                    <p:cond delay="0"/>
+                                  </p:stCondLst>
+                                  <p:childTnLst>
+                                    <p:set>
+                                      <p:cBhvr>
+                                        <p:cTn id="39" dur="1" fill="hold">
+                                          <p:stCondLst>
+                                            <p:cond delay="0"/>
+                                          </p:stCondLst>
+                                        </p:cTn>
+                                        <p:tgtEl>
+                                          <p:spTgt spid="3">
+                                            <p:txEl>
+                                              <p:pRg st="9" end="9"/>
+                                            </p:txEl>
+                                          </p:spTgt>
+                                        </p:tgtEl>
+                                        <p:attrNameLst>
+                                          <p:attrName>style.visibility</p:attrName>
+                                        </p:attrNameLst>
+                                      </p:cBhvr>
+                                      <p:to>
+                                        <p:strVal val="visible"/>
+                                      </p:to>
+                                    </p:set>
+                                    <p:animEffect transition="in" filter="fade">
+                                      <p:cBhvr>
+                                        <p:cTn id="40" dur="500"/>
+                                        <p:tgtEl>
+                                          <p:spTgt spid="3">
+                                            <p:txEl>
+                                              <p:pRg st="9" end="9"/>
+                                            </p:txEl>
+                                          </p:spTgt>
+                                        </p:tgtEl>
+                                      </p:cBhvr>
+                                    </p:animEffect>
+                                  </p:childTnLst>
+                                </p:cTn>
+                              </p:par>
+                              <p:par>
+                                <p:cTn id="41" presetID="10" presetClass="entr" presetSubtype="0" fill="hold" grpId="0" nodeType="withEffect">
+                                  <p:stCondLst>
+                                    <p:cond delay="0"/>
+                                  </p:stCondLst>
+                                  <p:childTnLst>
+                                    <p:set>
+                                      <p:cBhvr>
+                                        <p:cTn id="42" dur="1" fill="hold">
+                                          <p:stCondLst>
+                                            <p:cond delay="0"/>
+                                          </p:stCondLst>
+                                        </p:cTn>
+                                        <p:tgtEl>
+                                          <p:spTgt spid="3">
+                                            <p:txEl>
+                                              <p:pRg st="10" end="10"/>
+                                            </p:txEl>
+                                          </p:spTgt>
+                                        </p:tgtEl>
+                                        <p:attrNameLst>
+                                          <p:attrName>style.visibility</p:attrName>
+                                        </p:attrNameLst>
+                                      </p:cBhvr>
+                                      <p:to>
+                                        <p:strVal val="visible"/>
+                                      </p:to>
+                                    </p:set>
+                                    <p:animEffect transition="in" filter="fade">
+                                      <p:cBhvr>
+                                        <p:cTn id="43" dur="500"/>
+                                        <p:tgtEl>
+                                          <p:spTgt spid="3">
+                                            <p:txEl>
+                                              <p:pRg st="10" end="10"/>
+                                            </p:txEl>
+                                          </p:spTgt>
+                                        </p:tgtEl>
+                                      </p:cBhvr>
+                                    </p:animEffect>
+                                  </p:childTnLst>
+                                </p:cTn>
+                              </p:par>
+                            </p:childTnLst>
+                          </p:cTn>
+                        </p:par>
+                        <p:par>
+                          <p:cTn id="44" fill="hold">
+                            <p:stCondLst>
+                              <p:cond delay="500"/>
+                            </p:stCondLst>
+                            <p:childTnLst>
+                              <p:par>
+                                <p:cTn id="45" presetID="10" presetClass="entr" presetSubtype="0" fill="hold" grpId="0" nodeType="afterEffect">
+                                  <p:stCondLst>
+                                    <p:cond delay="0"/>
+                                  </p:stCondLst>
+                                  <p:childTnLst>
+                                    <p:set>
+                                      <p:cBhvr>
+                                        <p:cTn id="46" dur="1" fill="hold">
+                                          <p:stCondLst>
+                                            <p:cond delay="0"/>
+                                          </p:stCondLst>
+                                        </p:cTn>
+                                        <p:tgtEl>
+                                          <p:spTgt spid="4"/>
+                                        </p:tgtEl>
+                                        <p:attrNameLst>
+                                          <p:attrName>style.visibility</p:attrName>
+                                        </p:attrNameLst>
+                                      </p:cBhvr>
+                                      <p:to>
+                                        <p:strVal val="visible"/>
+                                      </p:to>
+                                    </p:set>
+                                    <p:animEffect transition="in" filter="fade">
+                                      <p:cBhvr>
+                                        <p:cTn id="47" dur="500"/>
+                                        <p:tgtEl>
+                                          <p:spTgt spid="4"/>
+                                        </p:tgtEl>
+                                      </p:cBhvr>
+                                    </p:animEffect>
+                                  </p:childTnLst>
+                                </p:cTn>
+                              </p:par>
+                            </p:childTnLst>
+                          </p:cTn>
+                        </p:par>
+                      </p:childTnLst>
+                    </p:cTn>
+                  </p:par>
+                </p:childTnLst>
+              </p:cTn>
+              <p:prevCondLst>
+                <p:cond evt="onPrev" delay="0">
+                  <p:tgtEl>
+                    <p:sldTgt/>
+                  </p:tgtEl>
+                </p:cond>
+              </p:prevCondLst>
+              <p:nextCondLst>
+                <p:cond evt="onNext" delay="0">
+                  <p:tgtEl>
+                    <p:sldTgt/>
+                  </p:tgtEl>
+                </p:cond>
+              </p:nextCondLst>
+            </p:seq>
+          </p:childTnLst>
+        </p:cTn>
       </p:par>
     </p:tnLst>
+    <p:bldLst>
+      <p:bldP spid="3" grpId="0" build="p"/>
+      <p:bldP spid="4" grpId="0" animBg="1"/>
+    </p:bldLst>
   </p:timing>
 </p:sld>
 </file>

</xml_diff>